<commit_message>
Moved project approach to resources folder
</commit_message>
<xml_diff>
--- a/resources/Project-charter.pptx
+++ b/resources/Project-charter.pptx
@@ -3344,7 +3344,15 @@
           <a:p>
             <a:r>
               <a:rPr lang="en-US" dirty="0"/>
-              <a:t>Project – Impact on population/economy after a major event ( disaster / positive)</a:t>
+              <a:t>Project – Impact on </a:t>
+            </a:r>
+            <a:r>
+              <a:rPr lang="en-US" dirty="0" err="1"/>
+              <a:t>birth_rate</a:t>
+            </a:r>
+            <a:r>
+              <a:rPr lang="en-US" dirty="0"/>
+              <a:t> /economy after a major event ( disaster / positive)</a:t>
             </a:r>
           </a:p>
         </p:txBody>
@@ -3365,10 +3373,15 @@
             <p:ph idx="1"/>
           </p:nvPr>
         </p:nvSpPr>
-        <p:spPr/>
+        <p:spPr>
+          <a:xfrm>
+            <a:off x="838200" y="1825625"/>
+            <a:ext cx="5068614" cy="4351338"/>
+          </a:xfrm>
+        </p:spPr>
         <p:txBody>
           <a:bodyPr>
-            <a:normAutofit lnSpcReduction="10000"/>
+            <a:normAutofit fontScale="77500" lnSpcReduction="20000"/>
           </a:bodyPr>
           <a:lstStyle/>
           <a:p>
@@ -3409,7 +3422,7 @@
             <a:pPr lvl="1"/>
             <a:r>
               <a:rPr lang="en-US" dirty="0"/>
-              <a:t>Lakers </a:t>
+              <a:t>MLB 2008 </a:t>
             </a:r>
           </a:p>
           <a:p>
@@ -3422,7 +3435,7 @@
           <a:p>
             <a:r>
               <a:rPr lang="en-US" dirty="0"/>
-              <a:t>Impact</a:t>
+              <a:t>Correlation</a:t>
             </a:r>
           </a:p>
           <a:p>
@@ -3445,6 +3458,310 @@
               <a:rPr lang="en-US" dirty="0"/>
               <a:t>Unemployment</a:t>
             </a:r>
+          </a:p>
+          <a:p>
+            <a:pPr lvl="1"/>
+            <a:r>
+              <a:rPr lang="en-US" dirty="0"/>
+              <a:t>GDP</a:t>
+            </a:r>
+          </a:p>
+          <a:p>
+            <a:r>
+              <a:rPr lang="en-US" dirty="0"/>
+              <a:t>Notes/feedback/comments</a:t>
+            </a:r>
+          </a:p>
+          <a:p>
+            <a:pPr lvl="1"/>
+            <a:r>
+              <a:rPr lang="en-US" dirty="0"/>
+              <a:t>***Use prediction for say pre 2008 birth rate and comparison with the actual </a:t>
+            </a:r>
+          </a:p>
+        </p:txBody>
+      </p:sp>
+      <p:sp>
+        <p:nvSpPr>
+          <p:cNvPr id="4" name="Content Placeholder 2">
+            <a:extLst>
+              <a:ext uri="{FF2B5EF4-FFF2-40B4-BE49-F238E27FC236}">
+                <a16:creationId xmlns:a16="http://schemas.microsoft.com/office/drawing/2014/main" id="{DE07730E-86A2-C7C9-32DD-F26A16155677}"/>
+              </a:ext>
+            </a:extLst>
+          </p:cNvPr>
+          <p:cNvSpPr txBox="1">
+            <a:spLocks/>
+          </p:cNvSpPr>
+          <p:nvPr/>
+        </p:nvSpPr>
+        <p:spPr>
+          <a:xfrm>
+            <a:off x="6203731" y="1599653"/>
+            <a:ext cx="5068614" cy="4351338"/>
+          </a:xfrm>
+          <a:prstGeom prst="rect">
+            <a:avLst/>
+          </a:prstGeom>
+        </p:spPr>
+        <p:txBody>
+          <a:bodyPr vert="horz" lIns="91440" tIns="45720" rIns="91440" bIns="45720" rtlCol="0">
+            <a:normAutofit fontScale="77500" lnSpcReduction="20000"/>
+          </a:bodyPr>
+          <a:lstStyle>
+            <a:lvl1pPr marL="228600" indent="-228600" algn="l" defTabSz="914400" rtl="0" eaLnBrk="1" latinLnBrk="0" hangingPunct="1">
+              <a:lnSpc>
+                <a:spcPct val="90000"/>
+              </a:lnSpc>
+              <a:spcBef>
+                <a:spcPts val="1000"/>
+              </a:spcBef>
+              <a:buFont typeface="Arial" panose="020B0604020202020204" pitchFamily="34" charset="0"/>
+              <a:buChar char="•"/>
+              <a:defRPr sz="2800" kern="1200">
+                <a:solidFill>
+                  <a:schemeClr val="tx1"/>
+                </a:solidFill>
+                <a:latin typeface="+mn-lt"/>
+                <a:ea typeface="+mn-ea"/>
+                <a:cs typeface="+mn-cs"/>
+              </a:defRPr>
+            </a:lvl1pPr>
+            <a:lvl2pPr marL="685800" indent="-228600" algn="l" defTabSz="914400" rtl="0" eaLnBrk="1" latinLnBrk="0" hangingPunct="1">
+              <a:lnSpc>
+                <a:spcPct val="90000"/>
+              </a:lnSpc>
+              <a:spcBef>
+                <a:spcPts val="500"/>
+              </a:spcBef>
+              <a:buFont typeface="Arial" panose="020B0604020202020204" pitchFamily="34" charset="0"/>
+              <a:buChar char="•"/>
+              <a:defRPr sz="2400" kern="1200">
+                <a:solidFill>
+                  <a:schemeClr val="tx1"/>
+                </a:solidFill>
+                <a:latin typeface="+mn-lt"/>
+                <a:ea typeface="+mn-ea"/>
+                <a:cs typeface="+mn-cs"/>
+              </a:defRPr>
+            </a:lvl2pPr>
+            <a:lvl3pPr marL="1143000" indent="-228600" algn="l" defTabSz="914400" rtl="0" eaLnBrk="1" latinLnBrk="0" hangingPunct="1">
+              <a:lnSpc>
+                <a:spcPct val="90000"/>
+              </a:lnSpc>
+              <a:spcBef>
+                <a:spcPts val="500"/>
+              </a:spcBef>
+              <a:buFont typeface="Arial" panose="020B0604020202020204" pitchFamily="34" charset="0"/>
+              <a:buChar char="•"/>
+              <a:defRPr sz="2000" kern="1200">
+                <a:solidFill>
+                  <a:schemeClr val="tx1"/>
+                </a:solidFill>
+                <a:latin typeface="+mn-lt"/>
+                <a:ea typeface="+mn-ea"/>
+                <a:cs typeface="+mn-cs"/>
+              </a:defRPr>
+            </a:lvl3pPr>
+            <a:lvl4pPr marL="1600200" indent="-228600" algn="l" defTabSz="914400" rtl="0" eaLnBrk="1" latinLnBrk="0" hangingPunct="1">
+              <a:lnSpc>
+                <a:spcPct val="90000"/>
+              </a:lnSpc>
+              <a:spcBef>
+                <a:spcPts val="500"/>
+              </a:spcBef>
+              <a:buFont typeface="Arial" panose="020B0604020202020204" pitchFamily="34" charset="0"/>
+              <a:buChar char="•"/>
+              <a:defRPr sz="1800" kern="1200">
+                <a:solidFill>
+                  <a:schemeClr val="tx1"/>
+                </a:solidFill>
+                <a:latin typeface="+mn-lt"/>
+                <a:ea typeface="+mn-ea"/>
+                <a:cs typeface="+mn-cs"/>
+              </a:defRPr>
+            </a:lvl4pPr>
+            <a:lvl5pPr marL="2057400" indent="-228600" algn="l" defTabSz="914400" rtl="0" eaLnBrk="1" latinLnBrk="0" hangingPunct="1">
+              <a:lnSpc>
+                <a:spcPct val="90000"/>
+              </a:lnSpc>
+              <a:spcBef>
+                <a:spcPts val="500"/>
+              </a:spcBef>
+              <a:buFont typeface="Arial" panose="020B0604020202020204" pitchFamily="34" charset="0"/>
+              <a:buChar char="•"/>
+              <a:defRPr sz="1800" kern="1200">
+                <a:solidFill>
+                  <a:schemeClr val="tx1"/>
+                </a:solidFill>
+                <a:latin typeface="+mn-lt"/>
+                <a:ea typeface="+mn-ea"/>
+                <a:cs typeface="+mn-cs"/>
+              </a:defRPr>
+            </a:lvl5pPr>
+            <a:lvl6pPr marL="2514600" indent="-228600" algn="l" defTabSz="914400" rtl="0" eaLnBrk="1" latinLnBrk="0" hangingPunct="1">
+              <a:lnSpc>
+                <a:spcPct val="90000"/>
+              </a:lnSpc>
+              <a:spcBef>
+                <a:spcPts val="500"/>
+              </a:spcBef>
+              <a:buFont typeface="Arial" panose="020B0604020202020204" pitchFamily="34" charset="0"/>
+              <a:buChar char="•"/>
+              <a:defRPr sz="1800" kern="1200">
+                <a:solidFill>
+                  <a:schemeClr val="tx1"/>
+                </a:solidFill>
+                <a:latin typeface="+mn-lt"/>
+                <a:ea typeface="+mn-ea"/>
+                <a:cs typeface="+mn-cs"/>
+              </a:defRPr>
+            </a:lvl6pPr>
+            <a:lvl7pPr marL="2971800" indent="-228600" algn="l" defTabSz="914400" rtl="0" eaLnBrk="1" latinLnBrk="0" hangingPunct="1">
+              <a:lnSpc>
+                <a:spcPct val="90000"/>
+              </a:lnSpc>
+              <a:spcBef>
+                <a:spcPts val="500"/>
+              </a:spcBef>
+              <a:buFont typeface="Arial" panose="020B0604020202020204" pitchFamily="34" charset="0"/>
+              <a:buChar char="•"/>
+              <a:defRPr sz="1800" kern="1200">
+                <a:solidFill>
+                  <a:schemeClr val="tx1"/>
+                </a:solidFill>
+                <a:latin typeface="+mn-lt"/>
+                <a:ea typeface="+mn-ea"/>
+                <a:cs typeface="+mn-cs"/>
+              </a:defRPr>
+            </a:lvl7pPr>
+            <a:lvl8pPr marL="3429000" indent="-228600" algn="l" defTabSz="914400" rtl="0" eaLnBrk="1" latinLnBrk="0" hangingPunct="1">
+              <a:lnSpc>
+                <a:spcPct val="90000"/>
+              </a:lnSpc>
+              <a:spcBef>
+                <a:spcPts val="500"/>
+              </a:spcBef>
+              <a:buFont typeface="Arial" panose="020B0604020202020204" pitchFamily="34" charset="0"/>
+              <a:buChar char="•"/>
+              <a:defRPr sz="1800" kern="1200">
+                <a:solidFill>
+                  <a:schemeClr val="tx1"/>
+                </a:solidFill>
+                <a:latin typeface="+mn-lt"/>
+                <a:ea typeface="+mn-ea"/>
+                <a:cs typeface="+mn-cs"/>
+              </a:defRPr>
+            </a:lvl8pPr>
+            <a:lvl9pPr marL="3886200" indent="-228600" algn="l" defTabSz="914400" rtl="0" eaLnBrk="1" latinLnBrk="0" hangingPunct="1">
+              <a:lnSpc>
+                <a:spcPct val="90000"/>
+              </a:lnSpc>
+              <a:spcBef>
+                <a:spcPts val="500"/>
+              </a:spcBef>
+              <a:buFont typeface="Arial" panose="020B0604020202020204" pitchFamily="34" charset="0"/>
+              <a:buChar char="•"/>
+              <a:defRPr sz="1800" kern="1200">
+                <a:solidFill>
+                  <a:schemeClr val="tx1"/>
+                </a:solidFill>
+                <a:latin typeface="+mn-lt"/>
+                <a:ea typeface="+mn-ea"/>
+                <a:cs typeface="+mn-cs"/>
+              </a:defRPr>
+            </a:lvl9pPr>
+          </a:lstStyle>
+          <a:p>
+            <a:r>
+              <a:rPr lang="en-US" dirty="0"/>
+              <a:t>Sources</a:t>
+            </a:r>
+          </a:p>
+          <a:p>
+            <a:r>
+              <a:rPr lang="en-US" sz="1400" dirty="0">
+                <a:hlinkClick r:id="rId2"/>
+              </a:rPr>
+              <a:t>https://www.kaggle.com/datasets/asaniczka/unemployment-rates-by-demographics-1978-2023</a:t>
+            </a:r>
+            <a:endParaRPr lang="en-US" sz="1400" dirty="0"/>
+          </a:p>
+          <a:p>
+            <a:r>
+              <a:rPr lang="en-US" sz="1400" dirty="0">
+                <a:hlinkClick r:id="rId3"/>
+              </a:rPr>
+              <a:t>https://www.kaggle.com/datasets/asaniczka/employment-to-population-ratio-for-usa-1979-2023</a:t>
+            </a:r>
+            <a:endParaRPr lang="en-US" sz="1400" dirty="0"/>
+          </a:p>
+          <a:p>
+            <a:r>
+              <a:rPr lang="en-US" sz="1400" dirty="0">
+                <a:hlinkClick r:id="rId4"/>
+              </a:rPr>
+              <a:t>https://www.kaggle.com/datasets/henryhan117/sp-500-historical-data</a:t>
+            </a:r>
+            <a:endParaRPr lang="en-US" sz="1400" dirty="0"/>
+          </a:p>
+          <a:p>
+            <a:r>
+              <a:rPr lang="en-US" sz="1400" dirty="0">
+                <a:hlinkClick r:id="rId5"/>
+              </a:rPr>
+              <a:t>https://www.kaggle.com/datasets/thedevastator/us-monthly-birth-data</a:t>
+            </a:r>
+            <a:r>
+              <a:rPr lang="en-US" sz="1400" dirty="0"/>
+              <a:t> </a:t>
+            </a:r>
+          </a:p>
+          <a:p>
+            <a:r>
+              <a:rPr lang="en-US" dirty="0"/>
+              <a:t>Questions we plan to answer</a:t>
+            </a:r>
+          </a:p>
+          <a:p>
+            <a:pPr lvl="1"/>
+            <a:r>
+              <a:rPr lang="en-US" dirty="0"/>
+              <a:t>What is the correlation between a major event and birth rate of a region?</a:t>
+            </a:r>
+          </a:p>
+          <a:p>
+            <a:pPr lvl="1"/>
+            <a:r>
+              <a:rPr lang="en-US" dirty="0"/>
+              <a:t>What is the correlation between an event and the economic factors (unemployment, GDP and S&amp;P500)</a:t>
+            </a:r>
+          </a:p>
+          <a:p>
+            <a:pPr lvl="1"/>
+            <a:r>
+              <a:rPr lang="en-US" dirty="0"/>
+              <a:t>What is the difference in the forecast (based on historical data) and actuals (after the event)</a:t>
+            </a:r>
+          </a:p>
+          <a:p>
+            <a:pPr lvl="1"/>
+            <a:r>
+              <a:rPr lang="en-US" dirty="0"/>
+              <a:t>What is the correlation between the economic factors and the birth rate?</a:t>
+            </a:r>
+          </a:p>
+          <a:p>
+            <a:pPr lvl="1"/>
+            <a:endParaRPr lang="en-US" dirty="0"/>
+          </a:p>
+          <a:p>
+            <a:pPr lvl="1"/>
+            <a:endParaRPr lang="en-US" dirty="0"/>
+          </a:p>
+          <a:p>
+            <a:pPr lvl="1"/>
+            <a:endParaRPr lang="en-US" dirty="0"/>
           </a:p>
         </p:txBody>
       </p:sp>

</xml_diff>